<commit_message>
fixed error on removing disconnected players
</commit_message>
<xml_diff>
--- a/CMP2204 Project.pptx
+++ b/CMP2204 Project.pptx
@@ -10275,10 +10275,10 @@
       </p:sp>
       <p:pic>
         <p:nvPicPr>
-          <p:cNvPr id="5" name="Picture 4">
+          <p:cNvPr id="3" name="Picture 2">
             <a:extLst>
               <a:ext uri="{FF2B5EF4-FFF2-40B4-BE49-F238E27FC236}">
-                <a16:creationId xmlns:a16="http://schemas.microsoft.com/office/drawing/2014/main" id="{1B93064B-E8B0-C052-A92B-2B38D9997E9E}"/>
+                <a16:creationId xmlns:a16="http://schemas.microsoft.com/office/drawing/2014/main" id="{0F35DEC4-55AC-44C5-02C4-DF1193AE9B2C}"/>
               </a:ext>
             </a:extLst>
           </p:cNvPr>
@@ -10295,8 +10295,8 @@
         </p:blipFill>
         <p:spPr>
           <a:xfrm>
-            <a:off x="356557" y="774641"/>
-            <a:ext cx="5038750" cy="5933286"/>
+            <a:off x="250613" y="774640"/>
+            <a:ext cx="5463345" cy="6017062"/>
           </a:xfrm>
           <a:prstGeom prst="rect">
             <a:avLst/>

</xml_diff>